<commit_message>
Hide the site/trap panel from the context menu
</commit_message>
<xml_diff>
--- a/Documents/MSMClient Setup.pptx
+++ b/Documents/MSMClient Setup.pptx
@@ -5,10 +5,10 @@
     <p:sldMasterId id="2147493686" r:id="rId4"/>
   </p:sldMasterIdLst>
   <p:notesMasterIdLst>
-    <p:notesMasterId r:id="rId20"/>
+    <p:notesMasterId r:id="rId21"/>
   </p:notesMasterIdLst>
   <p:handoutMasterIdLst>
-    <p:handoutMasterId r:id="rId21"/>
+    <p:handoutMasterId r:id="rId22"/>
   </p:handoutMasterIdLst>
   <p:sldIdLst>
     <p:sldId id="256" r:id="rId5"/>
@@ -25,7 +25,8 @@
     <p:sldId id="319" r:id="rId16"/>
     <p:sldId id="315" r:id="rId17"/>
     <p:sldId id="318" r:id="rId18"/>
-    <p:sldId id="302" r:id="rId19"/>
+    <p:sldId id="320" r:id="rId19"/>
+    <p:sldId id="302" r:id="rId20"/>
   </p:sldIdLst>
   <p:sldSz cx="9144000" cy="6858000" type="screen4x3"/>
   <p:notesSz cx="6797675" cy="9926638"/>
@@ -215,7 +216,7 @@
           <a:p>
             <a:fld id="{4ADB0E6B-678F-1341-8AD8-874F7755E8E3}" type="datetimeFigureOut">
               <a:rPr lang="en-US" smtClean="0"/>
-              <a:t>7/3/2018</a:t>
+              <a:t>7/5/2018</a:t>
             </a:fld>
             <a:endParaRPr lang="nb-NO"/>
           </a:p>
@@ -385,7 +386,7 @@
           <a:p>
             <a:fld id="{D16ED412-247A-E64A-A508-22EC5A89DD0E}" type="datetimeFigureOut">
               <a:rPr lang="en-US" smtClean="0"/>
-              <a:t>7/3/2018</a:t>
+              <a:t>7/5/2018</a:t>
             </a:fld>
             <a:endParaRPr lang="nb-NO"/>
           </a:p>
@@ -809,7 +810,7 @@
             <a:fld id="{3BE39584-3F3B-4D2E-BF52-9AADC3F436FF}" type="slidenum">
               <a:rPr lang="en-US" smtClean="0"/>
               <a:pPr/>
-              <a:t>15</a:t>
+              <a:t>16</a:t>
             </a:fld>
             <a:endParaRPr lang="en-US" dirty="0"/>
           </a:p>
@@ -1370,7 +1371,7 @@
           <a:p>
             <a:fld id="{B474EC79-A33E-48BA-B874-CEED5C811EDB}" type="datetime3">
               <a:rPr lang="en-US" noProof="0" smtClean="0"/>
-              <a:t>3 July 2018</a:t>
+              <a:t>5 July 2018</a:t>
             </a:fld>
             <a:endParaRPr lang="en-US" noProof="0"/>
           </a:p>
@@ -1579,7 +1580,7 @@
           <a:p>
             <a:fld id="{03E56E70-E982-43A5-B325-B7C723B28CCC}" type="datetime3">
               <a:rPr lang="en-US" noProof="0" smtClean="0"/>
-              <a:t>3 July 2018</a:t>
+              <a:t>5 July 2018</a:t>
             </a:fld>
             <a:endParaRPr lang="en-US" noProof="0" dirty="0"/>
           </a:p>
@@ -1764,7 +1765,7 @@
           <a:p>
             <a:fld id="{B539E609-B16F-4BBD-9B38-D8CA27043A70}" type="datetime3">
               <a:rPr lang="en-US" noProof="0" smtClean="0"/>
-              <a:t>3 July 2018</a:t>
+              <a:t>5 July 2018</a:t>
             </a:fld>
             <a:endParaRPr lang="en-US" noProof="0" dirty="0"/>
           </a:p>
@@ -4267,7 +4268,7 @@
           <a:p>
             <a:fld id="{20C8A506-0772-4387-87B6-5E5D3B892DCC}" type="datetime3">
               <a:rPr lang="en-US" noProof="0" smtClean="0"/>
-              <a:t>3 July 2018</a:t>
+              <a:t>5 July 2018</a:t>
             </a:fld>
             <a:endParaRPr lang="en-US" noProof="0" dirty="0"/>
           </a:p>
@@ -6750,7 +6751,7 @@
           <a:p>
             <a:fld id="{F2DA1B61-33C2-40D7-B85D-75A20EE564B9}" type="datetime3">
               <a:rPr lang="en-US" noProof="0" smtClean="0"/>
-              <a:t>3 July 2018</a:t>
+              <a:t>5 July 2018</a:t>
             </a:fld>
             <a:endParaRPr lang="en-US" noProof="0" dirty="0"/>
           </a:p>
@@ -7559,7 +7560,7 @@
           <a:p>
             <a:fld id="{954E6B0E-02E1-4A27-AD22-D7515AFC0EAF}" type="datetime3">
               <a:rPr lang="en-US" noProof="0" smtClean="0"/>
-              <a:t>3 July 2018</a:t>
+              <a:t>5 July 2018</a:t>
             </a:fld>
             <a:endParaRPr lang="en-US" noProof="0"/>
           </a:p>
@@ -7665,7 +7666,7 @@
           <a:p>
             <a:fld id="{989E49B0-9A1B-42DF-8C6C-A013DE98EFC2}" type="datetime3">
               <a:rPr lang="en-US" noProof="0" smtClean="0"/>
-              <a:t>3 July 2018</a:t>
+              <a:t>5 July 2018</a:t>
             </a:fld>
             <a:endParaRPr lang="en-US" noProof="0"/>
           </a:p>
@@ -7934,7 +7935,7 @@
           <a:p>
             <a:fld id="{F79ADBB9-C270-46CA-AD0A-1C2992CB78D8}" type="datetime3">
               <a:rPr lang="en-US" noProof="0" smtClean="0"/>
-              <a:t>3 July 2018</a:t>
+              <a:t>5 July 2018</a:t>
             </a:fld>
             <a:endParaRPr lang="en-US" noProof="0" dirty="0"/>
           </a:p>
@@ -8321,7 +8322,7 @@
           <a:p>
             <a:fld id="{EA61411C-8B61-47E2-9CB7-C164FC8DED7C}" type="datetime3">
               <a:rPr lang="en-US" noProof="0" smtClean="0"/>
-              <a:t>3 July 2018</a:t>
+              <a:t>5 July 2018</a:t>
             </a:fld>
             <a:endParaRPr lang="en-US" noProof="0" dirty="0"/>
           </a:p>
@@ -8543,7 +8544,7 @@
           <a:p>
             <a:fld id="{5E4CAF5F-D71A-47E4-B758-5559F6692072}" type="datetime3">
               <a:rPr lang="en-US" noProof="0" smtClean="0"/>
-              <a:t>3 July 2018</a:t>
+              <a:t>5 July 2018</a:t>
             </a:fld>
             <a:endParaRPr lang="en-US" noProof="0" dirty="0"/>
           </a:p>
@@ -8895,7 +8896,7 @@
           <a:p>
             <a:fld id="{ACBDE24C-A209-4AA7-B2AD-2060CF480FB4}" type="datetime3">
               <a:rPr lang="en-US" noProof="0" smtClean="0"/>
-              <a:t>3 July 2018</a:t>
+              <a:t>5 July 2018</a:t>
             </a:fld>
             <a:endParaRPr lang="en-US" noProof="0"/>
           </a:p>
@@ -9271,7 +9272,7 @@
           <a:p>
             <a:fld id="{D47E42BF-87E9-42FE-80F2-229119B89C2D}" type="datetime3">
               <a:rPr lang="en-US" noProof="0" smtClean="0"/>
-              <a:t>3 July 2018</a:t>
+              <a:t>5 July 2018</a:t>
             </a:fld>
             <a:endParaRPr lang="en-US" noProof="0" dirty="0"/>
           </a:p>
@@ -9562,7 +9563,7 @@
           <a:p>
             <a:fld id="{6DF25C91-E069-4586-A511-F18D051C1459}" type="datetime3">
               <a:rPr lang="en-US" noProof="0" smtClean="0"/>
-              <a:t>3 July 2018</a:t>
+              <a:t>5 July 2018</a:t>
             </a:fld>
             <a:endParaRPr lang="en-US" noProof="0"/>
           </a:p>
@@ -10278,7 +10279,7 @@
           <a:p>
             <a:fld id="{BBF8BD41-B81C-427A-B4E1-4A8D48470767}" type="datetime3">
               <a:rPr lang="en-US" smtClean="0"/>
-              <a:t>3 July 2018</a:t>
+              <a:t>5 July 2018</a:t>
             </a:fld>
             <a:endParaRPr lang="en-US" dirty="0"/>
           </a:p>
@@ -12650,7 +12651,7 @@
           <a:p>
             <a:fld id="{954E6B0E-02E1-4A27-AD22-D7515AFC0EAF}" type="datetime3">
               <a:rPr lang="en-US" noProof="0" smtClean="0"/>
-              <a:t>3 July 2018</a:t>
+              <a:t>5 July 2018</a:t>
             </a:fld>
             <a:endParaRPr lang="en-US" noProof="0"/>
           </a:p>
@@ -12830,7 +12831,7 @@
           <a:p>
             <a:fld id="{954E6B0E-02E1-4A27-AD22-D7515AFC0EAF}" type="datetime3">
               <a:rPr lang="en-US" noProof="0" smtClean="0"/>
-              <a:t>3 July 2018</a:t>
+              <a:t>5 July 2018</a:t>
             </a:fld>
             <a:endParaRPr lang="en-US" noProof="0"/>
           </a:p>
@@ -12896,13 +12897,8 @@
             </a:r>
             <a:r>
               <a:rPr lang="en-US" dirty="0" smtClean="0"/>
-              <a:t> mechanism, so we need to provide username/password to login to the db</a:t>
-            </a:r>
-            <a:r>
-              <a:rPr lang="en-US" dirty="0" smtClean="0"/>
-              <a:t>.</a:t>
-            </a:r>
-            <a:endParaRPr lang="en-US" dirty="0" smtClean="0"/>
+              <a:t> mechanism, so we need to provide username/password to login to the db.</a:t>
+            </a:r>
           </a:p>
           <a:p>
             <a:endParaRPr lang="en-US" dirty="0"/>
@@ -13098,7 +13094,7 @@
           <a:p>
             <a:fld id="{954E6B0E-02E1-4A27-AD22-D7515AFC0EAF}" type="datetime3">
               <a:rPr lang="en-US" noProof="0" smtClean="0"/>
-              <a:t>3 July 2018</a:t>
+              <a:t>5 July 2018</a:t>
             </a:fld>
             <a:endParaRPr lang="en-US" noProof="0"/>
           </a:p>
@@ -13217,7 +13213,7 @@
           <a:p>
             <a:fld id="{954E6B0E-02E1-4A27-AD22-D7515AFC0EAF}" type="datetime3">
               <a:rPr lang="en-US" noProof="0" smtClean="0"/>
-              <a:t>3 July 2018</a:t>
+              <a:t>5 July 2018</a:t>
             </a:fld>
             <a:endParaRPr lang="en-US" noProof="0"/>
           </a:p>
@@ -13510,7 +13506,7 @@
           <a:p>
             <a:fld id="{954E6B0E-02E1-4A27-AD22-D7515AFC0EAF}" type="datetime3">
               <a:rPr lang="en-US" noProof="0" smtClean="0"/>
-              <a:t>3 July 2018</a:t>
+              <a:t>5 July 2018</a:t>
             </a:fld>
             <a:endParaRPr lang="en-US" noProof="0"/>
           </a:p>
@@ -13618,6 +13614,180 @@
 </file>
 
 <file path=ppt/slides/slide15.xml><?xml version="1.0" encoding="utf-8"?>
+<p:sld xmlns:a="http://schemas.openxmlformats.org/drawingml/2006/main" xmlns:r="http://schemas.openxmlformats.org/officeDocument/2006/relationships" xmlns:p="http://schemas.openxmlformats.org/presentationml/2006/main">
+  <p:cSld>
+    <p:spTree>
+      <p:nvGrpSpPr>
+        <p:cNvPr id="1" name=""/>
+        <p:cNvGrpSpPr/>
+        <p:nvPr/>
+      </p:nvGrpSpPr>
+      <p:grpSpPr>
+        <a:xfrm>
+          <a:off x="0" y="0"/>
+          <a:ext cx="0" cy="0"/>
+          <a:chOff x="0" y="0"/>
+          <a:chExt cx="0" cy="0"/>
+        </a:xfrm>
+      </p:grpSpPr>
+      <p:sp>
+        <p:nvSpPr>
+          <p:cNvPr id="2" name="Title 1"/>
+          <p:cNvSpPr>
+            <a:spLocks noGrp="1"/>
+          </p:cNvSpPr>
+          <p:nvPr>
+            <p:ph type="title"/>
+          </p:nvPr>
+        </p:nvSpPr>
+        <p:spPr/>
+        <p:txBody>
+          <a:bodyPr/>
+          <a:lstStyle/>
+          <a:p>
+            <a:r>
+              <a:rPr lang="en-US" dirty="0" smtClean="0"/>
+              <a:t>VS Code Debugging</a:t>
+            </a:r>
+            <a:endParaRPr lang="en-US" dirty="0"/>
+          </a:p>
+        </p:txBody>
+      </p:sp>
+      <p:sp>
+        <p:nvSpPr>
+          <p:cNvPr id="3" name="Content Placeholder 2"/>
+          <p:cNvSpPr>
+            <a:spLocks noGrp="1"/>
+          </p:cNvSpPr>
+          <p:nvPr>
+            <p:ph idx="1"/>
+          </p:nvPr>
+        </p:nvSpPr>
+        <p:spPr/>
+        <p:txBody>
+          <a:bodyPr/>
+          <a:lstStyle/>
+          <a:p>
+            <a:r>
+              <a:rPr lang="en-US" dirty="0" smtClean="0"/>
+              <a:t>1: Install </a:t>
+            </a:r>
+            <a:r>
+              <a:rPr lang="en-US" dirty="0"/>
+              <a:t>this one: </a:t>
+            </a:r>
+            <a:r>
+              <a:rPr lang="en-US" dirty="0">
+                <a:hlinkClick r:id="rId2"/>
+              </a:rPr>
+              <a:t>https://</a:t>
+            </a:r>
+            <a:r>
+              <a:rPr lang="en-US" dirty="0" smtClean="0">
+                <a:hlinkClick r:id="rId2"/>
+              </a:rPr>
+              <a:t>marketplace.visualstudio.com/items?itemName=msjsdiag.debugger-for-chrome</a:t>
+            </a:r>
+            <a:r>
+              <a:rPr lang="en-US" dirty="0" smtClean="0"/>
+              <a:t>	</a:t>
+            </a:r>
+          </a:p>
+          <a:p>
+            <a:r>
+              <a:rPr lang="en-US" dirty="0" smtClean="0"/>
+              <a:t>2: </a:t>
+            </a:r>
+            <a:r>
+              <a:rPr lang="en-US" dirty="0"/>
+              <a:t>Restart VS Code and open the folder containing the project you want to work </a:t>
+            </a:r>
+            <a:r>
+              <a:rPr lang="en-US" dirty="0" smtClean="0"/>
+              <a:t>on.</a:t>
+            </a:r>
+          </a:p>
+          <a:p>
+            <a:r>
+              <a:rPr lang="en-US" dirty="0" smtClean="0"/>
+              <a:t>3: After a project is built successfully (</a:t>
+            </a:r>
+            <a:r>
+              <a:rPr lang="en-US" dirty="0" err="1" smtClean="0"/>
+              <a:t>nmp</a:t>
+            </a:r>
+            <a:r>
+              <a:rPr lang="en-US" dirty="0" smtClean="0"/>
+              <a:t> start), press F5 and start debugging exactly as the Visual Studio.</a:t>
+            </a:r>
+            <a:endParaRPr lang="en-US" dirty="0"/>
+          </a:p>
+        </p:txBody>
+      </p:sp>
+      <p:sp>
+        <p:nvSpPr>
+          <p:cNvPr id="4" name="Date Placeholder 3"/>
+          <p:cNvSpPr>
+            <a:spLocks noGrp="1"/>
+          </p:cNvSpPr>
+          <p:nvPr>
+            <p:ph type="dt" sz="half" idx="10"/>
+          </p:nvPr>
+        </p:nvSpPr>
+        <p:spPr/>
+        <p:txBody>
+          <a:bodyPr/>
+          <a:lstStyle/>
+          <a:p>
+            <a:fld id="{954E6B0E-02E1-4A27-AD22-D7515AFC0EAF}" type="datetime3">
+              <a:rPr lang="en-US" noProof="0" smtClean="0"/>
+              <a:t>5 July 2018</a:t>
+            </a:fld>
+            <a:endParaRPr lang="en-US" noProof="0"/>
+          </a:p>
+        </p:txBody>
+      </p:sp>
+      <p:sp>
+        <p:nvSpPr>
+          <p:cNvPr id="5" name="Slide Number Placeholder 4"/>
+          <p:cNvSpPr>
+            <a:spLocks noGrp="1"/>
+          </p:cNvSpPr>
+          <p:nvPr>
+            <p:ph type="sldNum" sz="quarter" idx="12"/>
+          </p:nvPr>
+        </p:nvSpPr>
+        <p:spPr/>
+        <p:txBody>
+          <a:bodyPr/>
+          <a:lstStyle/>
+          <a:p>
+            <a:r>
+              <a:rPr lang="en-US" noProof="0" smtClean="0"/>
+              <a:t>Slide </a:t>
+            </a:r>
+            <a:fld id="{BBF40A20-1497-7A4D-A1C6-8D439CD1DBE4}" type="slidenum">
+              <a:rPr lang="en-US" noProof="0" smtClean="0"/>
+              <a:t>15</a:t>
+            </a:fld>
+            <a:endParaRPr lang="en-US" noProof="0"/>
+          </a:p>
+        </p:txBody>
+      </p:sp>
+    </p:spTree>
+    <p:extLst>
+      <p:ext uri="{BB962C8B-B14F-4D97-AF65-F5344CB8AC3E}">
+        <p14:creationId xmlns:p14="http://schemas.microsoft.com/office/powerpoint/2010/main" val="4058130866"/>
+      </p:ext>
+    </p:extLst>
+  </p:cSld>
+  <p:clrMapOvr>
+    <a:masterClrMapping/>
+  </p:clrMapOvr>
+</p:sld>
+</file>
+
+<file path=ppt/slides/slide16.xml><?xml version="1.0" encoding="utf-8"?>
 <p:sld xmlns:a="http://schemas.openxmlformats.org/drawingml/2006/main" xmlns:r="http://schemas.openxmlformats.org/officeDocument/2006/relationships" xmlns:p="http://schemas.openxmlformats.org/presentationml/2006/main">
   <p:cSld>
     <p:bg bwMode="gray">
@@ -13788,8 +13958,19 @@
             </a:r>
             <a:r>
               <a:rPr lang="en-US" dirty="0" smtClean="0"/>
-              <a:t> Setup</a:t>
-            </a:r>
+              <a:t> </a:t>
+            </a:r>
+            <a:r>
+              <a:rPr lang="en-US" dirty="0" smtClean="0"/>
+              <a:t>Setup</a:t>
+            </a:r>
+          </a:p>
+          <a:p>
+            <a:r>
+              <a:rPr lang="en-US"/>
+              <a:t>VS Code Debugging</a:t>
+            </a:r>
+            <a:endParaRPr lang="en-US" dirty="0" smtClean="0"/>
           </a:p>
           <a:p>
             <a:r>
@@ -13816,7 +13997,7 @@
           <a:p>
             <a:fld id="{954E6B0E-02E1-4A27-AD22-D7515AFC0EAF}" type="datetime3">
               <a:rPr lang="en-US" noProof="0" smtClean="0"/>
-              <a:t>3 July 2018</a:t>
+              <a:t>5 July 2018</a:t>
             </a:fld>
             <a:endParaRPr lang="en-US" noProof="0"/>
           </a:p>
@@ -14002,7 +14183,7 @@
           <a:p>
             <a:fld id="{954E6B0E-02E1-4A27-AD22-D7515AFC0EAF}" type="datetime3">
               <a:rPr lang="en-US" noProof="0" smtClean="0"/>
-              <a:t>3 July 2018</a:t>
+              <a:t>5 July 2018</a:t>
             </a:fld>
             <a:endParaRPr lang="en-US" noProof="0"/>
           </a:p>
@@ -14270,7 +14451,7 @@
           <a:p>
             <a:fld id="{954E6B0E-02E1-4A27-AD22-D7515AFC0EAF}" type="datetime3">
               <a:rPr lang="en-US" noProof="0" smtClean="0"/>
-              <a:t>3 July 2018</a:t>
+              <a:t>5 July 2018</a:t>
             </a:fld>
             <a:endParaRPr lang="en-US" noProof="0"/>
           </a:p>
@@ -14463,7 +14644,7 @@
           <a:p>
             <a:fld id="{954E6B0E-02E1-4A27-AD22-D7515AFC0EAF}" type="datetime3">
               <a:rPr lang="en-US" noProof="0" smtClean="0"/>
-              <a:t>3 July 2018</a:t>
+              <a:t>5 July 2018</a:t>
             </a:fld>
             <a:endParaRPr lang="en-US" noProof="0"/>
           </a:p>
@@ -14784,7 +14965,7 @@
           <a:p>
             <a:fld id="{954E6B0E-02E1-4A27-AD22-D7515AFC0EAF}" type="datetime3">
               <a:rPr lang="en-US" noProof="0" smtClean="0"/>
-              <a:t>3 July 2018</a:t>
+              <a:t>5 July 2018</a:t>
             </a:fld>
             <a:endParaRPr lang="en-US" noProof="0"/>
           </a:p>
@@ -14935,7 +15116,7 @@
           <a:p>
             <a:fld id="{954E6B0E-02E1-4A27-AD22-D7515AFC0EAF}" type="datetime3">
               <a:rPr lang="en-US" noProof="0" smtClean="0"/>
-              <a:t>3 July 2018</a:t>
+              <a:t>5 July 2018</a:t>
             </a:fld>
             <a:endParaRPr lang="en-US" noProof="0"/>
           </a:p>
@@ -15167,7 +15348,7 @@
           <a:p>
             <a:fld id="{954E6B0E-02E1-4A27-AD22-D7515AFC0EAF}" type="datetime3">
               <a:rPr lang="en-US" noProof="0" smtClean="0"/>
-              <a:t>3 July 2018</a:t>
+              <a:t>5 July 2018</a:t>
             </a:fld>
             <a:endParaRPr lang="en-US" noProof="0"/>
           </a:p>
@@ -15343,7 +15524,7 @@
           <a:p>
             <a:fld id="{954E6B0E-02E1-4A27-AD22-D7515AFC0EAF}" type="datetime3">
               <a:rPr lang="en-US" noProof="0" smtClean="0"/>
-              <a:t>3 July 2018</a:t>
+              <a:t>5 July 2018</a:t>
             </a:fld>
             <a:endParaRPr lang="en-US" noProof="0"/>
           </a:p>
@@ -16650,12 +16831,12 @@
 </file>
 
 <file path=customXml/item1.xml><?xml version="1.0" encoding="utf-8"?>
-<?mso-contentType ?>
-<FormTemplates xmlns="http://schemas.microsoft.com/sharepoint/v3/contenttype/forms">
-  <Display>DocumentLibraryForm</Display>
-  <Edit>DocumentLibraryForm</Edit>
-  <New>DocumentLibraryForm</New>
-</FormTemplates>
+<p:properties xmlns:p="http://schemas.microsoft.com/office/2006/metadata/properties" xmlns:xsi="http://www.w3.org/2001/XMLSchema-instance" xmlns:pc="http://schemas.microsoft.com/office/infopath/2007/PartnerControls">
+  <documentManagement>
+    <_Version xmlns="http://schemas.microsoft.com/sharepoint/v3/fields" xsi:nil="true"/>
+    <_Status xmlns="http://schemas.microsoft.com/sharepoint/v3/fields">Not Started</_Status>
+  </documentManagement>
+</p:properties>
 </file>
 
 <file path=customXml/item2.xml><?xml version="1.0" encoding="utf-8"?>
@@ -16803,18 +16984,26 @@
 </file>
 
 <file path=customXml/item3.xml><?xml version="1.0" encoding="utf-8"?>
-<p:properties xmlns:p="http://schemas.microsoft.com/office/2006/metadata/properties" xmlns:xsi="http://www.w3.org/2001/XMLSchema-instance" xmlns:pc="http://schemas.microsoft.com/office/infopath/2007/PartnerControls">
-  <documentManagement>
-    <_Version xmlns="http://schemas.microsoft.com/sharepoint/v3/fields" xsi:nil="true"/>
-    <_Status xmlns="http://schemas.microsoft.com/sharepoint/v3/fields">Not Started</_Status>
-  </documentManagement>
-</p:properties>
+<?mso-contentType ?>
+<FormTemplates xmlns="http://schemas.microsoft.com/sharepoint/v3/contenttype/forms">
+  <Display>DocumentLibraryForm</Display>
+  <Edit>DocumentLibraryForm</Edit>
+  <New>DocumentLibraryForm</New>
+</FormTemplates>
 </file>
 
 <file path=customXml/itemProps1.xml><?xml version="1.0" encoding="utf-8"?>
-<ds:datastoreItem xmlns:ds="http://schemas.openxmlformats.org/officeDocument/2006/customXml" ds:itemID="{87D2A1B0-FF3E-4009-940D-AED0EB70AA20}">
+<ds:datastoreItem xmlns:ds="http://schemas.openxmlformats.org/officeDocument/2006/customXml" ds:itemID="{7B6F2769-7194-4217-93D3-3AF3A4742282}">
   <ds:schemaRefs>
-    <ds:schemaRef ds:uri="http://schemas.microsoft.com/sharepoint/v3/contenttype/forms"/>
+    <ds:schemaRef ds:uri="http://schemas.microsoft.com/sharepoint/v3/fields"/>
+    <ds:schemaRef ds:uri="http://schemas.microsoft.com/office/2006/documentManagement/types"/>
+    <ds:schemaRef ds:uri="http://purl.org/dc/terms/"/>
+    <ds:schemaRef ds:uri="http://www.w3.org/XML/1998/namespace"/>
+    <ds:schemaRef ds:uri="http://schemas.openxmlformats.org/package/2006/metadata/core-properties"/>
+    <ds:schemaRef ds:uri="http://purl.org/dc/elements/1.1/"/>
+    <ds:schemaRef ds:uri="http://purl.org/dc/dcmitype/"/>
+    <ds:schemaRef ds:uri="http://schemas.microsoft.com/office/infopath/2007/PartnerControls"/>
+    <ds:schemaRef ds:uri="http://schemas.microsoft.com/office/2006/metadata/properties"/>
   </ds:schemaRefs>
 </ds:datastoreItem>
 </file>
@@ -16838,17 +17027,9 @@
 </file>
 
 <file path=customXml/itemProps3.xml><?xml version="1.0" encoding="utf-8"?>
-<ds:datastoreItem xmlns:ds="http://schemas.openxmlformats.org/officeDocument/2006/customXml" ds:itemID="{7B6F2769-7194-4217-93D3-3AF3A4742282}">
+<ds:datastoreItem xmlns:ds="http://schemas.openxmlformats.org/officeDocument/2006/customXml" ds:itemID="{87D2A1B0-FF3E-4009-940D-AED0EB70AA20}">
   <ds:schemaRefs>
-    <ds:schemaRef ds:uri="http://schemas.microsoft.com/sharepoint/v3/fields"/>
-    <ds:schemaRef ds:uri="http://schemas.microsoft.com/office/2006/documentManagement/types"/>
-    <ds:schemaRef ds:uri="http://purl.org/dc/terms/"/>
-    <ds:schemaRef ds:uri="http://www.w3.org/XML/1998/namespace"/>
-    <ds:schemaRef ds:uri="http://schemas.openxmlformats.org/package/2006/metadata/core-properties"/>
-    <ds:schemaRef ds:uri="http://purl.org/dc/elements/1.1/"/>
-    <ds:schemaRef ds:uri="http://purl.org/dc/dcmitype/"/>
-    <ds:schemaRef ds:uri="http://schemas.microsoft.com/office/infopath/2007/PartnerControls"/>
-    <ds:schemaRef ds:uri="http://schemas.microsoft.com/office/2006/metadata/properties"/>
+    <ds:schemaRef ds:uri="http://schemas.microsoft.com/sharepoint/v3/contenttype/forms"/>
   </ds:schemaRefs>
 </ds:datastoreItem>
 </file>
</xml_diff>